<commit_message>
Update Project Presentation Template.pptx
</commit_message>
<xml_diff>
--- a/Project Presentation Template.pptx
+++ b/Project Presentation Template.pptx
@@ -6,6 +6,18 @@
   </p:sldMasterIdLst>
   <p:sldIdLst>
     <p:sldId id="256" r:id="rId2"/>
+    <p:sldId id="258" r:id="rId3"/>
+    <p:sldId id="257" r:id="rId4"/>
+    <p:sldId id="259" r:id="rId5"/>
+    <p:sldId id="260" r:id="rId6"/>
+    <p:sldId id="261" r:id="rId7"/>
+    <p:sldId id="262" r:id="rId8"/>
+    <p:sldId id="265" r:id="rId9"/>
+    <p:sldId id="266" r:id="rId10"/>
+    <p:sldId id="267" r:id="rId11"/>
+    <p:sldId id="268" r:id="rId12"/>
+    <p:sldId id="263" r:id="rId13"/>
+    <p:sldId id="264" r:id="rId14"/>
   </p:sldIdLst>
   <p:sldSz cx="12192000" cy="6858000"/>
   <p:notesSz cx="6858000" cy="9144000"/>
@@ -104,6 +116,11 @@
       </a:defRPr>
     </a:lvl9pPr>
   </p:defaultTextStyle>
+  <p:extLst>
+    <p:ext uri="{EFAFB233-063F-42B5-8137-9DF3F51BA10A}">
+      <p15:sldGuideLst xmlns:p15="http://schemas.microsoft.com/office/powerpoint/2012/main"/>
+    </p:ext>
+  </p:extLst>
 </p:presentation>
 </file>
 
@@ -254,7 +271,7 @@
           <a:p>
             <a:fld id="{F0115755-0214-4CC6-99A7-95D98871674A}" type="datetimeFigureOut">
               <a:rPr lang="en-US" smtClean="0"/>
-              <a:t>12/4/2022</a:t>
+              <a:t>12/5/2022</a:t>
             </a:fld>
             <a:endParaRPr lang="en-US"/>
           </a:p>
@@ -452,7 +469,7 @@
           <a:p>
             <a:fld id="{F0115755-0214-4CC6-99A7-95D98871674A}" type="datetimeFigureOut">
               <a:rPr lang="en-US" smtClean="0"/>
-              <a:t>12/4/2022</a:t>
+              <a:t>12/5/2022</a:t>
             </a:fld>
             <a:endParaRPr lang="en-US"/>
           </a:p>
@@ -660,7 +677,7 @@
           <a:p>
             <a:fld id="{F0115755-0214-4CC6-99A7-95D98871674A}" type="datetimeFigureOut">
               <a:rPr lang="en-US" smtClean="0"/>
-              <a:t>12/4/2022</a:t>
+              <a:t>12/5/2022</a:t>
             </a:fld>
             <a:endParaRPr lang="en-US"/>
           </a:p>
@@ -858,7 +875,7 @@
           <a:p>
             <a:fld id="{F0115755-0214-4CC6-99A7-95D98871674A}" type="datetimeFigureOut">
               <a:rPr lang="en-US" smtClean="0"/>
-              <a:t>12/4/2022</a:t>
+              <a:t>12/5/2022</a:t>
             </a:fld>
             <a:endParaRPr lang="en-US"/>
           </a:p>
@@ -1133,7 +1150,7 @@
           <a:p>
             <a:fld id="{F0115755-0214-4CC6-99A7-95D98871674A}" type="datetimeFigureOut">
               <a:rPr lang="en-US" smtClean="0"/>
-              <a:t>12/4/2022</a:t>
+              <a:t>12/5/2022</a:t>
             </a:fld>
             <a:endParaRPr lang="en-US"/>
           </a:p>
@@ -1398,7 +1415,7 @@
           <a:p>
             <a:fld id="{F0115755-0214-4CC6-99A7-95D98871674A}" type="datetimeFigureOut">
               <a:rPr lang="en-US" smtClean="0"/>
-              <a:t>12/4/2022</a:t>
+              <a:t>12/5/2022</a:t>
             </a:fld>
             <a:endParaRPr lang="en-US"/>
           </a:p>
@@ -1810,7 +1827,7 @@
           <a:p>
             <a:fld id="{F0115755-0214-4CC6-99A7-95D98871674A}" type="datetimeFigureOut">
               <a:rPr lang="en-US" smtClean="0"/>
-              <a:t>12/4/2022</a:t>
+              <a:t>12/5/2022</a:t>
             </a:fld>
             <a:endParaRPr lang="en-US"/>
           </a:p>
@@ -1951,7 +1968,7 @@
           <a:p>
             <a:fld id="{F0115755-0214-4CC6-99A7-95D98871674A}" type="datetimeFigureOut">
               <a:rPr lang="en-US" smtClean="0"/>
-              <a:t>12/4/2022</a:t>
+              <a:t>12/5/2022</a:t>
             </a:fld>
             <a:endParaRPr lang="en-US"/>
           </a:p>
@@ -2064,7 +2081,7 @@
           <a:p>
             <a:fld id="{F0115755-0214-4CC6-99A7-95D98871674A}" type="datetimeFigureOut">
               <a:rPr lang="en-US" smtClean="0"/>
-              <a:t>12/4/2022</a:t>
+              <a:t>12/5/2022</a:t>
             </a:fld>
             <a:endParaRPr lang="en-US"/>
           </a:p>
@@ -2375,7 +2392,7 @@
           <a:p>
             <a:fld id="{F0115755-0214-4CC6-99A7-95D98871674A}" type="datetimeFigureOut">
               <a:rPr lang="en-US" smtClean="0"/>
-              <a:t>12/4/2022</a:t>
+              <a:t>12/5/2022</a:t>
             </a:fld>
             <a:endParaRPr lang="en-US"/>
           </a:p>
@@ -2663,7 +2680,7 @@
           <a:p>
             <a:fld id="{F0115755-0214-4CC6-99A7-95D98871674A}" type="datetimeFigureOut">
               <a:rPr lang="en-US" smtClean="0"/>
-              <a:t>12/4/2022</a:t>
+              <a:t>12/5/2022</a:t>
             </a:fld>
             <a:endParaRPr lang="en-US"/>
           </a:p>
@@ -2904,7 +2921,7 @@
           <a:p>
             <a:fld id="{F0115755-0214-4CC6-99A7-95D98871674A}" type="datetimeFigureOut">
               <a:rPr lang="en-US" smtClean="0"/>
-              <a:t>12/4/2022</a:t>
+              <a:t>12/5/2022</a:t>
             </a:fld>
             <a:endParaRPr lang="en-US"/>
           </a:p>
@@ -3422,6 +3439,1215 @@
 </p:sld>
 </file>
 
+<file path=ppt/slides/slide10.xml><?xml version="1.0" encoding="utf-8"?>
+<p:sld xmlns:a="http://schemas.openxmlformats.org/drawingml/2006/main" xmlns:r="http://schemas.openxmlformats.org/officeDocument/2006/relationships" xmlns:p="http://schemas.openxmlformats.org/presentationml/2006/main">
+  <p:cSld>
+    <p:spTree>
+      <p:nvGrpSpPr>
+        <p:cNvPr id="1" name=""/>
+        <p:cNvGrpSpPr/>
+        <p:nvPr/>
+      </p:nvGrpSpPr>
+      <p:grpSpPr>
+        <a:xfrm>
+          <a:off x="0" y="0"/>
+          <a:ext cx="0" cy="0"/>
+          <a:chOff x="0" y="0"/>
+          <a:chExt cx="0" cy="0"/>
+        </a:xfrm>
+      </p:grpSpPr>
+      <p:sp>
+        <p:nvSpPr>
+          <p:cNvPr id="4" name="Title 3">
+            <a:extLst>
+              <a:ext uri="{FF2B5EF4-FFF2-40B4-BE49-F238E27FC236}">
+                <a16:creationId xmlns:a16="http://schemas.microsoft.com/office/drawing/2014/main" id="{A8348381-F94E-1E08-559A-B780DCA65C20}"/>
+              </a:ext>
+            </a:extLst>
+          </p:cNvPr>
+          <p:cNvSpPr>
+            <a:spLocks noGrp="1"/>
+          </p:cNvSpPr>
+          <p:nvPr>
+            <p:ph type="title"/>
+          </p:nvPr>
+        </p:nvSpPr>
+        <p:spPr/>
+        <p:txBody>
+          <a:bodyPr/>
+          <a:lstStyle/>
+          <a:p>
+            <a:r>
+              <a:rPr lang="en-US" dirty="0"/>
+              <a:t>Descriptive Analytics </a:t>
+            </a:r>
+          </a:p>
+        </p:txBody>
+      </p:sp>
+      <p:sp>
+        <p:nvSpPr>
+          <p:cNvPr id="5" name="Text Placeholder 4">
+            <a:extLst>
+              <a:ext uri="{FF2B5EF4-FFF2-40B4-BE49-F238E27FC236}">
+                <a16:creationId xmlns:a16="http://schemas.microsoft.com/office/drawing/2014/main" id="{25519FC3-21BA-ECC8-2CCC-89A5CB1A363F}"/>
+              </a:ext>
+            </a:extLst>
+          </p:cNvPr>
+          <p:cNvSpPr>
+            <a:spLocks noGrp="1"/>
+          </p:cNvSpPr>
+          <p:nvPr>
+            <p:ph type="body" idx="1"/>
+          </p:nvPr>
+        </p:nvSpPr>
+        <p:spPr/>
+        <p:txBody>
+          <a:bodyPr/>
+          <a:lstStyle/>
+          <a:p>
+            <a:endParaRPr lang="en-US"/>
+          </a:p>
+        </p:txBody>
+      </p:sp>
+    </p:spTree>
+    <p:extLst>
+      <p:ext uri="{BB962C8B-B14F-4D97-AF65-F5344CB8AC3E}">
+        <p14:creationId xmlns:p14="http://schemas.microsoft.com/office/powerpoint/2010/main" val="650729950"/>
+      </p:ext>
+    </p:extLst>
+  </p:cSld>
+  <p:clrMapOvr>
+    <a:masterClrMapping/>
+  </p:clrMapOvr>
+</p:sld>
+</file>
+
+<file path=ppt/slides/slide11.xml><?xml version="1.0" encoding="utf-8"?>
+<p:sld xmlns:a="http://schemas.openxmlformats.org/drawingml/2006/main" xmlns:r="http://schemas.openxmlformats.org/officeDocument/2006/relationships" xmlns:p="http://schemas.openxmlformats.org/presentationml/2006/main">
+  <p:cSld>
+    <p:spTree>
+      <p:nvGrpSpPr>
+        <p:cNvPr id="1" name=""/>
+        <p:cNvGrpSpPr/>
+        <p:nvPr/>
+      </p:nvGrpSpPr>
+      <p:grpSpPr>
+        <a:xfrm>
+          <a:off x="0" y="0"/>
+          <a:ext cx="0" cy="0"/>
+          <a:chOff x="0" y="0"/>
+          <a:chExt cx="0" cy="0"/>
+        </a:xfrm>
+      </p:grpSpPr>
+      <p:sp>
+        <p:nvSpPr>
+          <p:cNvPr id="2" name="Title 1">
+            <a:extLst>
+              <a:ext uri="{FF2B5EF4-FFF2-40B4-BE49-F238E27FC236}">
+                <a16:creationId xmlns:a16="http://schemas.microsoft.com/office/drawing/2014/main" id="{43EE6C72-03D5-F7F0-1189-4C7BA75BAA61}"/>
+              </a:ext>
+            </a:extLst>
+          </p:cNvPr>
+          <p:cNvSpPr>
+            <a:spLocks noGrp="1"/>
+          </p:cNvSpPr>
+          <p:nvPr>
+            <p:ph type="title"/>
+          </p:nvPr>
+        </p:nvSpPr>
+        <p:spPr/>
+        <p:txBody>
+          <a:bodyPr/>
+          <a:lstStyle/>
+          <a:p>
+            <a:r>
+              <a:rPr lang="en-US" dirty="0"/>
+              <a:t>Descriptive analytics </a:t>
+            </a:r>
+          </a:p>
+        </p:txBody>
+      </p:sp>
+      <p:sp>
+        <p:nvSpPr>
+          <p:cNvPr id="3" name="Content Placeholder 2">
+            <a:extLst>
+              <a:ext uri="{FF2B5EF4-FFF2-40B4-BE49-F238E27FC236}">
+                <a16:creationId xmlns:a16="http://schemas.microsoft.com/office/drawing/2014/main" id="{2CAC2674-75A1-6757-F8C2-5CD61FD6D8AE}"/>
+              </a:ext>
+            </a:extLst>
+          </p:cNvPr>
+          <p:cNvSpPr>
+            <a:spLocks noGrp="1"/>
+          </p:cNvSpPr>
+          <p:nvPr>
+            <p:ph idx="1"/>
+          </p:nvPr>
+        </p:nvSpPr>
+        <p:spPr/>
+        <p:txBody>
+          <a:bodyPr/>
+          <a:lstStyle/>
+          <a:p>
+            <a:r>
+              <a:rPr lang="en-US" dirty="0">
+                <a:highlight>
+                  <a:srgbClr val="FFFF00"/>
+                </a:highlight>
+              </a:rPr>
+              <a:t>Use clustering and association rules to describe the data </a:t>
+            </a:r>
+          </a:p>
+          <a:p>
+            <a:r>
+              <a:rPr lang="en-US" dirty="0">
+                <a:highlight>
+                  <a:srgbClr val="FFFF00"/>
+                </a:highlight>
+              </a:rPr>
+              <a:t>What are the findings? </a:t>
+            </a:r>
+          </a:p>
+          <a:p>
+            <a:r>
+              <a:rPr lang="en-US" dirty="0">
+                <a:highlight>
+                  <a:srgbClr val="FFFF00"/>
+                </a:highlight>
+              </a:rPr>
+              <a:t>Evaluate results</a:t>
+            </a:r>
+          </a:p>
+          <a:p>
+            <a:endParaRPr lang="en-US" dirty="0">
+              <a:highlight>
+                <a:srgbClr val="FFFF00"/>
+              </a:highlight>
+            </a:endParaRPr>
+          </a:p>
+        </p:txBody>
+      </p:sp>
+    </p:spTree>
+    <p:extLst>
+      <p:ext uri="{BB962C8B-B14F-4D97-AF65-F5344CB8AC3E}">
+        <p14:creationId xmlns:p14="http://schemas.microsoft.com/office/powerpoint/2010/main" val="2248834242"/>
+      </p:ext>
+    </p:extLst>
+  </p:cSld>
+  <p:clrMapOvr>
+    <a:masterClrMapping/>
+  </p:clrMapOvr>
+</p:sld>
+</file>
+
+<file path=ppt/slides/slide12.xml><?xml version="1.0" encoding="utf-8"?>
+<p:sld xmlns:a="http://schemas.openxmlformats.org/drawingml/2006/main" xmlns:r="http://schemas.openxmlformats.org/officeDocument/2006/relationships" xmlns:p="http://schemas.openxmlformats.org/presentationml/2006/main">
+  <p:cSld>
+    <p:spTree>
+      <p:nvGrpSpPr>
+        <p:cNvPr id="1" name=""/>
+        <p:cNvGrpSpPr/>
+        <p:nvPr/>
+      </p:nvGrpSpPr>
+      <p:grpSpPr>
+        <a:xfrm>
+          <a:off x="0" y="0"/>
+          <a:ext cx="0" cy="0"/>
+          <a:chOff x="0" y="0"/>
+          <a:chExt cx="0" cy="0"/>
+        </a:xfrm>
+      </p:grpSpPr>
+      <p:sp>
+        <p:nvSpPr>
+          <p:cNvPr id="4" name="Title 3">
+            <a:extLst>
+              <a:ext uri="{FF2B5EF4-FFF2-40B4-BE49-F238E27FC236}">
+                <a16:creationId xmlns:a16="http://schemas.microsoft.com/office/drawing/2014/main" id="{A8348381-F94E-1E08-559A-B780DCA65C20}"/>
+              </a:ext>
+            </a:extLst>
+          </p:cNvPr>
+          <p:cNvSpPr>
+            <a:spLocks noGrp="1"/>
+          </p:cNvSpPr>
+          <p:nvPr>
+            <p:ph type="title"/>
+          </p:nvPr>
+        </p:nvSpPr>
+        <p:spPr/>
+        <p:txBody>
+          <a:bodyPr/>
+          <a:lstStyle/>
+          <a:p>
+            <a:r>
+              <a:rPr lang="en-US" dirty="0"/>
+              <a:t>Predictive Analytics </a:t>
+            </a:r>
+          </a:p>
+        </p:txBody>
+      </p:sp>
+      <p:sp>
+        <p:nvSpPr>
+          <p:cNvPr id="5" name="Text Placeholder 4">
+            <a:extLst>
+              <a:ext uri="{FF2B5EF4-FFF2-40B4-BE49-F238E27FC236}">
+                <a16:creationId xmlns:a16="http://schemas.microsoft.com/office/drawing/2014/main" id="{25519FC3-21BA-ECC8-2CCC-89A5CB1A363F}"/>
+              </a:ext>
+            </a:extLst>
+          </p:cNvPr>
+          <p:cNvSpPr>
+            <a:spLocks noGrp="1"/>
+          </p:cNvSpPr>
+          <p:nvPr>
+            <p:ph type="body" idx="1"/>
+          </p:nvPr>
+        </p:nvSpPr>
+        <p:spPr/>
+        <p:txBody>
+          <a:bodyPr/>
+          <a:lstStyle/>
+          <a:p>
+            <a:endParaRPr lang="en-US"/>
+          </a:p>
+        </p:txBody>
+      </p:sp>
+    </p:spTree>
+    <p:extLst>
+      <p:ext uri="{BB962C8B-B14F-4D97-AF65-F5344CB8AC3E}">
+        <p14:creationId xmlns:p14="http://schemas.microsoft.com/office/powerpoint/2010/main" val="3752500180"/>
+      </p:ext>
+    </p:extLst>
+  </p:cSld>
+  <p:clrMapOvr>
+    <a:masterClrMapping/>
+  </p:clrMapOvr>
+</p:sld>
+</file>
+
+<file path=ppt/slides/slide13.xml><?xml version="1.0" encoding="utf-8"?>
+<p:sld xmlns:a="http://schemas.openxmlformats.org/drawingml/2006/main" xmlns:r="http://schemas.openxmlformats.org/officeDocument/2006/relationships" xmlns:p="http://schemas.openxmlformats.org/presentationml/2006/main">
+  <p:cSld>
+    <p:spTree>
+      <p:nvGrpSpPr>
+        <p:cNvPr id="1" name=""/>
+        <p:cNvGrpSpPr/>
+        <p:nvPr/>
+      </p:nvGrpSpPr>
+      <p:grpSpPr>
+        <a:xfrm>
+          <a:off x="0" y="0"/>
+          <a:ext cx="0" cy="0"/>
+          <a:chOff x="0" y="0"/>
+          <a:chExt cx="0" cy="0"/>
+        </a:xfrm>
+      </p:grpSpPr>
+      <p:sp>
+        <p:nvSpPr>
+          <p:cNvPr id="2" name="Title 1">
+            <a:extLst>
+              <a:ext uri="{FF2B5EF4-FFF2-40B4-BE49-F238E27FC236}">
+                <a16:creationId xmlns:a16="http://schemas.microsoft.com/office/drawing/2014/main" id="{43EE6C72-03D5-F7F0-1189-4C7BA75BAA61}"/>
+              </a:ext>
+            </a:extLst>
+          </p:cNvPr>
+          <p:cNvSpPr>
+            <a:spLocks noGrp="1"/>
+          </p:cNvSpPr>
+          <p:nvPr>
+            <p:ph type="title"/>
+          </p:nvPr>
+        </p:nvSpPr>
+        <p:spPr/>
+        <p:txBody>
+          <a:bodyPr/>
+          <a:lstStyle/>
+          <a:p>
+            <a:r>
+              <a:rPr lang="en-US" dirty="0"/>
+              <a:t>Predictive analytics </a:t>
+            </a:r>
+          </a:p>
+        </p:txBody>
+      </p:sp>
+      <p:sp>
+        <p:nvSpPr>
+          <p:cNvPr id="3" name="Content Placeholder 2">
+            <a:extLst>
+              <a:ext uri="{FF2B5EF4-FFF2-40B4-BE49-F238E27FC236}">
+                <a16:creationId xmlns:a16="http://schemas.microsoft.com/office/drawing/2014/main" id="{2CAC2674-75A1-6757-F8C2-5CD61FD6D8AE}"/>
+              </a:ext>
+            </a:extLst>
+          </p:cNvPr>
+          <p:cNvSpPr>
+            <a:spLocks noGrp="1"/>
+          </p:cNvSpPr>
+          <p:nvPr>
+            <p:ph idx="1"/>
+          </p:nvPr>
+        </p:nvSpPr>
+        <p:spPr/>
+        <p:txBody>
+          <a:bodyPr/>
+          <a:lstStyle/>
+          <a:p>
+            <a:r>
+              <a:rPr lang="en-US" dirty="0">
+                <a:highlight>
+                  <a:srgbClr val="FFFF00"/>
+                </a:highlight>
+              </a:rPr>
+              <a:t>Use machine learning models to predict the future (what will happen?)?</a:t>
+            </a:r>
+          </a:p>
+          <a:p>
+            <a:r>
+              <a:rPr lang="en-US" dirty="0">
+                <a:highlight>
+                  <a:srgbClr val="FFFF00"/>
+                </a:highlight>
+              </a:rPr>
+              <a:t>Compare ML results</a:t>
+            </a:r>
+          </a:p>
+          <a:p>
+            <a:r>
+              <a:rPr lang="en-US" dirty="0">
+                <a:highlight>
+                  <a:srgbClr val="FFFF00"/>
+                </a:highlight>
+              </a:rPr>
+              <a:t>Evaluate results</a:t>
+            </a:r>
+          </a:p>
+          <a:p>
+            <a:endParaRPr lang="en-US" dirty="0">
+              <a:highlight>
+                <a:srgbClr val="FFFF00"/>
+              </a:highlight>
+            </a:endParaRPr>
+          </a:p>
+          <a:p>
+            <a:endParaRPr lang="en-US" dirty="0">
+              <a:highlight>
+                <a:srgbClr val="FFFF00"/>
+              </a:highlight>
+            </a:endParaRPr>
+          </a:p>
+        </p:txBody>
+      </p:sp>
+    </p:spTree>
+    <p:extLst>
+      <p:ext uri="{BB962C8B-B14F-4D97-AF65-F5344CB8AC3E}">
+        <p14:creationId xmlns:p14="http://schemas.microsoft.com/office/powerpoint/2010/main" val="3821526636"/>
+      </p:ext>
+    </p:extLst>
+  </p:cSld>
+  <p:clrMapOvr>
+    <a:masterClrMapping/>
+  </p:clrMapOvr>
+</p:sld>
+</file>
+
+<file path=ppt/slides/slide2.xml><?xml version="1.0" encoding="utf-8"?>
+<p:sld xmlns:a="http://schemas.openxmlformats.org/drawingml/2006/main" xmlns:r="http://schemas.openxmlformats.org/officeDocument/2006/relationships" xmlns:p="http://schemas.openxmlformats.org/presentationml/2006/main">
+  <p:cSld>
+    <p:spTree>
+      <p:nvGrpSpPr>
+        <p:cNvPr id="1" name=""/>
+        <p:cNvGrpSpPr/>
+        <p:nvPr/>
+      </p:nvGrpSpPr>
+      <p:grpSpPr>
+        <a:xfrm>
+          <a:off x="0" y="0"/>
+          <a:ext cx="0" cy="0"/>
+          <a:chOff x="0" y="0"/>
+          <a:chExt cx="0" cy="0"/>
+        </a:xfrm>
+      </p:grpSpPr>
+      <p:sp>
+        <p:nvSpPr>
+          <p:cNvPr id="4" name="Title 3">
+            <a:extLst>
+              <a:ext uri="{FF2B5EF4-FFF2-40B4-BE49-F238E27FC236}">
+                <a16:creationId xmlns:a16="http://schemas.microsoft.com/office/drawing/2014/main" id="{A8348381-F94E-1E08-559A-B780DCA65C20}"/>
+              </a:ext>
+            </a:extLst>
+          </p:cNvPr>
+          <p:cNvSpPr>
+            <a:spLocks noGrp="1"/>
+          </p:cNvSpPr>
+          <p:nvPr>
+            <p:ph type="title"/>
+          </p:nvPr>
+        </p:nvSpPr>
+        <p:spPr/>
+        <p:txBody>
+          <a:bodyPr/>
+          <a:lstStyle/>
+          <a:p>
+            <a:r>
+              <a:rPr lang="en-US" dirty="0"/>
+              <a:t>About the domain</a:t>
+            </a:r>
+          </a:p>
+        </p:txBody>
+      </p:sp>
+      <p:sp>
+        <p:nvSpPr>
+          <p:cNvPr id="5" name="Text Placeholder 4">
+            <a:extLst>
+              <a:ext uri="{FF2B5EF4-FFF2-40B4-BE49-F238E27FC236}">
+                <a16:creationId xmlns:a16="http://schemas.microsoft.com/office/drawing/2014/main" id="{25519FC3-21BA-ECC8-2CCC-89A5CB1A363F}"/>
+              </a:ext>
+            </a:extLst>
+          </p:cNvPr>
+          <p:cNvSpPr>
+            <a:spLocks noGrp="1"/>
+          </p:cNvSpPr>
+          <p:nvPr>
+            <p:ph type="body" idx="1"/>
+          </p:nvPr>
+        </p:nvSpPr>
+        <p:spPr/>
+        <p:txBody>
+          <a:bodyPr/>
+          <a:lstStyle/>
+          <a:p>
+            <a:endParaRPr lang="en-US"/>
+          </a:p>
+        </p:txBody>
+      </p:sp>
+    </p:spTree>
+    <p:extLst>
+      <p:ext uri="{BB962C8B-B14F-4D97-AF65-F5344CB8AC3E}">
+        <p14:creationId xmlns:p14="http://schemas.microsoft.com/office/powerpoint/2010/main" val="3318840614"/>
+      </p:ext>
+    </p:extLst>
+  </p:cSld>
+  <p:clrMapOvr>
+    <a:masterClrMapping/>
+  </p:clrMapOvr>
+</p:sld>
+</file>
+
+<file path=ppt/slides/slide3.xml><?xml version="1.0" encoding="utf-8"?>
+<p:sld xmlns:a="http://schemas.openxmlformats.org/drawingml/2006/main" xmlns:r="http://schemas.openxmlformats.org/officeDocument/2006/relationships" xmlns:p="http://schemas.openxmlformats.org/presentationml/2006/main">
+  <p:cSld>
+    <p:spTree>
+      <p:nvGrpSpPr>
+        <p:cNvPr id="1" name=""/>
+        <p:cNvGrpSpPr/>
+        <p:nvPr/>
+      </p:nvGrpSpPr>
+      <p:grpSpPr>
+        <a:xfrm>
+          <a:off x="0" y="0"/>
+          <a:ext cx="0" cy="0"/>
+          <a:chOff x="0" y="0"/>
+          <a:chExt cx="0" cy="0"/>
+        </a:xfrm>
+      </p:grpSpPr>
+      <p:sp>
+        <p:nvSpPr>
+          <p:cNvPr id="2" name="Title 1">
+            <a:extLst>
+              <a:ext uri="{FF2B5EF4-FFF2-40B4-BE49-F238E27FC236}">
+                <a16:creationId xmlns:a16="http://schemas.microsoft.com/office/drawing/2014/main" id="{43EE6C72-03D5-F7F0-1189-4C7BA75BAA61}"/>
+              </a:ext>
+            </a:extLst>
+          </p:cNvPr>
+          <p:cNvSpPr>
+            <a:spLocks noGrp="1"/>
+          </p:cNvSpPr>
+          <p:nvPr>
+            <p:ph type="title"/>
+          </p:nvPr>
+        </p:nvSpPr>
+        <p:spPr/>
+        <p:txBody>
+          <a:bodyPr/>
+          <a:lstStyle/>
+          <a:p>
+            <a:r>
+              <a:rPr lang="en-US" dirty="0"/>
+              <a:t>About the domain</a:t>
+            </a:r>
+          </a:p>
+        </p:txBody>
+      </p:sp>
+      <p:sp>
+        <p:nvSpPr>
+          <p:cNvPr id="3" name="Content Placeholder 2">
+            <a:extLst>
+              <a:ext uri="{FF2B5EF4-FFF2-40B4-BE49-F238E27FC236}">
+                <a16:creationId xmlns:a16="http://schemas.microsoft.com/office/drawing/2014/main" id="{2CAC2674-75A1-6757-F8C2-5CD61FD6D8AE}"/>
+              </a:ext>
+            </a:extLst>
+          </p:cNvPr>
+          <p:cNvSpPr>
+            <a:spLocks noGrp="1"/>
+          </p:cNvSpPr>
+          <p:nvPr>
+            <p:ph idx="1"/>
+          </p:nvPr>
+        </p:nvSpPr>
+        <p:spPr/>
+        <p:txBody>
+          <a:bodyPr/>
+          <a:lstStyle/>
+          <a:p>
+            <a:r>
+              <a:rPr lang="en-US" dirty="0">
+                <a:highlight>
+                  <a:srgbClr val="FFFF00"/>
+                </a:highlight>
+              </a:rPr>
+              <a:t>Describe the business domain of the dataset here</a:t>
+            </a:r>
+          </a:p>
+          <a:p>
+            <a:r>
+              <a:rPr lang="en-US" dirty="0">
+                <a:highlight>
+                  <a:srgbClr val="FFFF00"/>
+                </a:highlight>
+              </a:rPr>
+              <a:t>Add slides as you want </a:t>
+            </a:r>
+          </a:p>
+        </p:txBody>
+      </p:sp>
+    </p:spTree>
+    <p:extLst>
+      <p:ext uri="{BB962C8B-B14F-4D97-AF65-F5344CB8AC3E}">
+        <p14:creationId xmlns:p14="http://schemas.microsoft.com/office/powerpoint/2010/main" val="3756280653"/>
+      </p:ext>
+    </p:extLst>
+  </p:cSld>
+  <p:clrMapOvr>
+    <a:masterClrMapping/>
+  </p:clrMapOvr>
+</p:sld>
+</file>
+
+<file path=ppt/slides/slide4.xml><?xml version="1.0" encoding="utf-8"?>
+<p:sld xmlns:a="http://schemas.openxmlformats.org/drawingml/2006/main" xmlns:r="http://schemas.openxmlformats.org/officeDocument/2006/relationships" xmlns:p="http://schemas.openxmlformats.org/presentationml/2006/main">
+  <p:cSld>
+    <p:spTree>
+      <p:nvGrpSpPr>
+        <p:cNvPr id="1" name=""/>
+        <p:cNvGrpSpPr/>
+        <p:nvPr/>
+      </p:nvGrpSpPr>
+      <p:grpSpPr>
+        <a:xfrm>
+          <a:off x="0" y="0"/>
+          <a:ext cx="0" cy="0"/>
+          <a:chOff x="0" y="0"/>
+          <a:chExt cx="0" cy="0"/>
+        </a:xfrm>
+      </p:grpSpPr>
+      <p:sp>
+        <p:nvSpPr>
+          <p:cNvPr id="4" name="Title 3">
+            <a:extLst>
+              <a:ext uri="{FF2B5EF4-FFF2-40B4-BE49-F238E27FC236}">
+                <a16:creationId xmlns:a16="http://schemas.microsoft.com/office/drawing/2014/main" id="{A8348381-F94E-1E08-559A-B780DCA65C20}"/>
+              </a:ext>
+            </a:extLst>
+          </p:cNvPr>
+          <p:cNvSpPr>
+            <a:spLocks noGrp="1"/>
+          </p:cNvSpPr>
+          <p:nvPr>
+            <p:ph type="title"/>
+          </p:nvPr>
+        </p:nvSpPr>
+        <p:spPr/>
+        <p:txBody>
+          <a:bodyPr/>
+          <a:lstStyle/>
+          <a:p>
+            <a:r>
+              <a:rPr lang="en-US" dirty="0"/>
+              <a:t>About the data</a:t>
+            </a:r>
+          </a:p>
+        </p:txBody>
+      </p:sp>
+      <p:sp>
+        <p:nvSpPr>
+          <p:cNvPr id="5" name="Text Placeholder 4">
+            <a:extLst>
+              <a:ext uri="{FF2B5EF4-FFF2-40B4-BE49-F238E27FC236}">
+                <a16:creationId xmlns:a16="http://schemas.microsoft.com/office/drawing/2014/main" id="{25519FC3-21BA-ECC8-2CCC-89A5CB1A363F}"/>
+              </a:ext>
+            </a:extLst>
+          </p:cNvPr>
+          <p:cNvSpPr>
+            <a:spLocks noGrp="1"/>
+          </p:cNvSpPr>
+          <p:nvPr>
+            <p:ph type="body" idx="1"/>
+          </p:nvPr>
+        </p:nvSpPr>
+        <p:spPr/>
+        <p:txBody>
+          <a:bodyPr/>
+          <a:lstStyle/>
+          <a:p>
+            <a:endParaRPr lang="en-US"/>
+          </a:p>
+        </p:txBody>
+      </p:sp>
+    </p:spTree>
+    <p:extLst>
+      <p:ext uri="{BB962C8B-B14F-4D97-AF65-F5344CB8AC3E}">
+        <p14:creationId xmlns:p14="http://schemas.microsoft.com/office/powerpoint/2010/main" val="2898937329"/>
+      </p:ext>
+    </p:extLst>
+  </p:cSld>
+  <p:clrMapOvr>
+    <a:masterClrMapping/>
+  </p:clrMapOvr>
+</p:sld>
+</file>
+
+<file path=ppt/slides/slide5.xml><?xml version="1.0" encoding="utf-8"?>
+<p:sld xmlns:a="http://schemas.openxmlformats.org/drawingml/2006/main" xmlns:r="http://schemas.openxmlformats.org/officeDocument/2006/relationships" xmlns:p="http://schemas.openxmlformats.org/presentationml/2006/main">
+  <p:cSld>
+    <p:spTree>
+      <p:nvGrpSpPr>
+        <p:cNvPr id="1" name=""/>
+        <p:cNvGrpSpPr/>
+        <p:nvPr/>
+      </p:nvGrpSpPr>
+      <p:grpSpPr>
+        <a:xfrm>
+          <a:off x="0" y="0"/>
+          <a:ext cx="0" cy="0"/>
+          <a:chOff x="0" y="0"/>
+          <a:chExt cx="0" cy="0"/>
+        </a:xfrm>
+      </p:grpSpPr>
+      <p:sp>
+        <p:nvSpPr>
+          <p:cNvPr id="2" name="Title 1">
+            <a:extLst>
+              <a:ext uri="{FF2B5EF4-FFF2-40B4-BE49-F238E27FC236}">
+                <a16:creationId xmlns:a16="http://schemas.microsoft.com/office/drawing/2014/main" id="{43EE6C72-03D5-F7F0-1189-4C7BA75BAA61}"/>
+              </a:ext>
+            </a:extLst>
+          </p:cNvPr>
+          <p:cNvSpPr>
+            <a:spLocks noGrp="1"/>
+          </p:cNvSpPr>
+          <p:nvPr>
+            <p:ph type="title"/>
+          </p:nvPr>
+        </p:nvSpPr>
+        <p:spPr/>
+        <p:txBody>
+          <a:bodyPr/>
+          <a:lstStyle/>
+          <a:p>
+            <a:r>
+              <a:rPr lang="en-US" dirty="0"/>
+              <a:t>About the domain</a:t>
+            </a:r>
+          </a:p>
+        </p:txBody>
+      </p:sp>
+      <p:sp>
+        <p:nvSpPr>
+          <p:cNvPr id="3" name="Content Placeholder 2">
+            <a:extLst>
+              <a:ext uri="{FF2B5EF4-FFF2-40B4-BE49-F238E27FC236}">
+                <a16:creationId xmlns:a16="http://schemas.microsoft.com/office/drawing/2014/main" id="{2CAC2674-75A1-6757-F8C2-5CD61FD6D8AE}"/>
+              </a:ext>
+            </a:extLst>
+          </p:cNvPr>
+          <p:cNvSpPr>
+            <a:spLocks noGrp="1"/>
+          </p:cNvSpPr>
+          <p:nvPr>
+            <p:ph idx="1"/>
+          </p:nvPr>
+        </p:nvSpPr>
+        <p:spPr/>
+        <p:txBody>
+          <a:bodyPr/>
+          <a:lstStyle/>
+          <a:p>
+            <a:r>
+              <a:rPr lang="en-US" dirty="0">
+                <a:highlight>
+                  <a:srgbClr val="FFFF00"/>
+                </a:highlight>
+              </a:rPr>
+              <a:t>Describe the dataset here</a:t>
+            </a:r>
+          </a:p>
+          <a:p>
+            <a:r>
+              <a:rPr lang="en-US" dirty="0">
+                <a:highlight>
+                  <a:srgbClr val="FFFF00"/>
+                </a:highlight>
+              </a:rPr>
+              <a:t>Add slides as you want </a:t>
+            </a:r>
+          </a:p>
+        </p:txBody>
+      </p:sp>
+    </p:spTree>
+    <p:extLst>
+      <p:ext uri="{BB962C8B-B14F-4D97-AF65-F5344CB8AC3E}">
+        <p14:creationId xmlns:p14="http://schemas.microsoft.com/office/powerpoint/2010/main" val="1589616354"/>
+      </p:ext>
+    </p:extLst>
+  </p:cSld>
+  <p:clrMapOvr>
+    <a:masterClrMapping/>
+  </p:clrMapOvr>
+</p:sld>
+</file>
+
+<file path=ppt/slides/slide6.xml><?xml version="1.0" encoding="utf-8"?>
+<p:sld xmlns:a="http://schemas.openxmlformats.org/drawingml/2006/main" xmlns:r="http://schemas.openxmlformats.org/officeDocument/2006/relationships" xmlns:p="http://schemas.openxmlformats.org/presentationml/2006/main">
+  <p:cSld>
+    <p:spTree>
+      <p:nvGrpSpPr>
+        <p:cNvPr id="1" name=""/>
+        <p:cNvGrpSpPr/>
+        <p:nvPr/>
+      </p:nvGrpSpPr>
+      <p:grpSpPr>
+        <a:xfrm>
+          <a:off x="0" y="0"/>
+          <a:ext cx="0" cy="0"/>
+          <a:chOff x="0" y="0"/>
+          <a:chExt cx="0" cy="0"/>
+        </a:xfrm>
+      </p:grpSpPr>
+      <p:sp>
+        <p:nvSpPr>
+          <p:cNvPr id="4" name="Title 3">
+            <a:extLst>
+              <a:ext uri="{FF2B5EF4-FFF2-40B4-BE49-F238E27FC236}">
+                <a16:creationId xmlns:a16="http://schemas.microsoft.com/office/drawing/2014/main" id="{A8348381-F94E-1E08-559A-B780DCA65C20}"/>
+              </a:ext>
+            </a:extLst>
+          </p:cNvPr>
+          <p:cNvSpPr>
+            <a:spLocks noGrp="1"/>
+          </p:cNvSpPr>
+          <p:nvPr>
+            <p:ph type="title"/>
+          </p:nvPr>
+        </p:nvSpPr>
+        <p:spPr/>
+        <p:txBody>
+          <a:bodyPr/>
+          <a:lstStyle/>
+          <a:p>
+            <a:r>
+              <a:rPr lang="en-US" dirty="0"/>
+              <a:t>Data Exploration </a:t>
+            </a:r>
+          </a:p>
+        </p:txBody>
+      </p:sp>
+      <p:sp>
+        <p:nvSpPr>
+          <p:cNvPr id="5" name="Text Placeholder 4">
+            <a:extLst>
+              <a:ext uri="{FF2B5EF4-FFF2-40B4-BE49-F238E27FC236}">
+                <a16:creationId xmlns:a16="http://schemas.microsoft.com/office/drawing/2014/main" id="{25519FC3-21BA-ECC8-2CCC-89A5CB1A363F}"/>
+              </a:ext>
+            </a:extLst>
+          </p:cNvPr>
+          <p:cNvSpPr>
+            <a:spLocks noGrp="1"/>
+          </p:cNvSpPr>
+          <p:nvPr>
+            <p:ph type="body" idx="1"/>
+          </p:nvPr>
+        </p:nvSpPr>
+        <p:spPr/>
+        <p:txBody>
+          <a:bodyPr/>
+          <a:lstStyle/>
+          <a:p>
+            <a:endParaRPr lang="en-US"/>
+          </a:p>
+        </p:txBody>
+      </p:sp>
+    </p:spTree>
+    <p:extLst>
+      <p:ext uri="{BB962C8B-B14F-4D97-AF65-F5344CB8AC3E}">
+        <p14:creationId xmlns:p14="http://schemas.microsoft.com/office/powerpoint/2010/main" val="2646417190"/>
+      </p:ext>
+    </p:extLst>
+  </p:cSld>
+  <p:clrMapOvr>
+    <a:masterClrMapping/>
+  </p:clrMapOvr>
+</p:sld>
+</file>
+
+<file path=ppt/slides/slide7.xml><?xml version="1.0" encoding="utf-8"?>
+<p:sld xmlns:a="http://schemas.openxmlformats.org/drawingml/2006/main" xmlns:r="http://schemas.openxmlformats.org/officeDocument/2006/relationships" xmlns:p="http://schemas.openxmlformats.org/presentationml/2006/main">
+  <p:cSld>
+    <p:spTree>
+      <p:nvGrpSpPr>
+        <p:cNvPr id="1" name=""/>
+        <p:cNvGrpSpPr/>
+        <p:nvPr/>
+      </p:nvGrpSpPr>
+      <p:grpSpPr>
+        <a:xfrm>
+          <a:off x="0" y="0"/>
+          <a:ext cx="0" cy="0"/>
+          <a:chOff x="0" y="0"/>
+          <a:chExt cx="0" cy="0"/>
+        </a:xfrm>
+      </p:grpSpPr>
+      <p:sp>
+        <p:nvSpPr>
+          <p:cNvPr id="2" name="Title 1">
+            <a:extLst>
+              <a:ext uri="{FF2B5EF4-FFF2-40B4-BE49-F238E27FC236}">
+                <a16:creationId xmlns:a16="http://schemas.microsoft.com/office/drawing/2014/main" id="{43EE6C72-03D5-F7F0-1189-4C7BA75BAA61}"/>
+              </a:ext>
+            </a:extLst>
+          </p:cNvPr>
+          <p:cNvSpPr>
+            <a:spLocks noGrp="1"/>
+          </p:cNvSpPr>
+          <p:nvPr>
+            <p:ph type="title"/>
+          </p:nvPr>
+        </p:nvSpPr>
+        <p:spPr/>
+        <p:txBody>
+          <a:bodyPr/>
+          <a:lstStyle/>
+          <a:p>
+            <a:r>
+              <a:rPr lang="en-US" dirty="0"/>
+              <a:t>Data exploration </a:t>
+            </a:r>
+          </a:p>
+        </p:txBody>
+      </p:sp>
+      <p:sp>
+        <p:nvSpPr>
+          <p:cNvPr id="3" name="Content Placeholder 2">
+            <a:extLst>
+              <a:ext uri="{FF2B5EF4-FFF2-40B4-BE49-F238E27FC236}">
+                <a16:creationId xmlns:a16="http://schemas.microsoft.com/office/drawing/2014/main" id="{2CAC2674-75A1-6757-F8C2-5CD61FD6D8AE}"/>
+              </a:ext>
+            </a:extLst>
+          </p:cNvPr>
+          <p:cNvSpPr>
+            <a:spLocks noGrp="1"/>
+          </p:cNvSpPr>
+          <p:nvPr>
+            <p:ph idx="1"/>
+          </p:nvPr>
+        </p:nvSpPr>
+        <p:spPr/>
+        <p:txBody>
+          <a:bodyPr/>
+          <a:lstStyle/>
+          <a:p>
+            <a:r>
+              <a:rPr lang="en-US" dirty="0">
+                <a:highlight>
+                  <a:srgbClr val="FFFF00"/>
+                </a:highlight>
+              </a:rPr>
+              <a:t>Use descriptive statistics </a:t>
+            </a:r>
+          </a:p>
+          <a:p>
+            <a:r>
+              <a:rPr lang="en-US" dirty="0">
+                <a:highlight>
+                  <a:srgbClr val="FFFF00"/>
+                </a:highlight>
+              </a:rPr>
+              <a:t>Use data visualization </a:t>
+            </a:r>
+          </a:p>
+          <a:p>
+            <a:r>
+              <a:rPr lang="en-US" dirty="0">
+                <a:highlight>
+                  <a:srgbClr val="FFFF00"/>
+                </a:highlight>
+              </a:rPr>
+              <a:t>Tell a story about what happened? </a:t>
+            </a:r>
+          </a:p>
+          <a:p>
+            <a:r>
+              <a:rPr lang="en-US" dirty="0">
+                <a:highlight>
+                  <a:srgbClr val="FFFF00"/>
+                </a:highlight>
+              </a:rPr>
+              <a:t>How many columns? How many rows?</a:t>
+            </a:r>
+          </a:p>
+          <a:p>
+            <a:r>
+              <a:rPr lang="en-US" dirty="0">
+                <a:highlight>
+                  <a:srgbClr val="FFFF00"/>
+                </a:highlight>
+              </a:rPr>
+              <a:t>Are there missing values? How many? </a:t>
+            </a:r>
+          </a:p>
+          <a:p>
+            <a:r>
+              <a:rPr lang="en-US" dirty="0">
+                <a:highlight>
+                  <a:srgbClr val="FFFF00"/>
+                </a:highlight>
+              </a:rPr>
+              <a:t>Add slides as you want </a:t>
+            </a:r>
+          </a:p>
+        </p:txBody>
+      </p:sp>
+    </p:spTree>
+    <p:extLst>
+      <p:ext uri="{BB962C8B-B14F-4D97-AF65-F5344CB8AC3E}">
+        <p14:creationId xmlns:p14="http://schemas.microsoft.com/office/powerpoint/2010/main" val="2781225567"/>
+      </p:ext>
+    </p:extLst>
+  </p:cSld>
+  <p:clrMapOvr>
+    <a:masterClrMapping/>
+  </p:clrMapOvr>
+</p:sld>
+</file>
+
+<file path=ppt/slides/slide8.xml><?xml version="1.0" encoding="utf-8"?>
+<p:sld xmlns:a="http://schemas.openxmlformats.org/drawingml/2006/main" xmlns:r="http://schemas.openxmlformats.org/officeDocument/2006/relationships" xmlns:p="http://schemas.openxmlformats.org/presentationml/2006/main">
+  <p:cSld>
+    <p:spTree>
+      <p:nvGrpSpPr>
+        <p:cNvPr id="1" name=""/>
+        <p:cNvGrpSpPr/>
+        <p:nvPr/>
+      </p:nvGrpSpPr>
+      <p:grpSpPr>
+        <a:xfrm>
+          <a:off x="0" y="0"/>
+          <a:ext cx="0" cy="0"/>
+          <a:chOff x="0" y="0"/>
+          <a:chExt cx="0" cy="0"/>
+        </a:xfrm>
+      </p:grpSpPr>
+      <p:sp>
+        <p:nvSpPr>
+          <p:cNvPr id="4" name="Title 3">
+            <a:extLst>
+              <a:ext uri="{FF2B5EF4-FFF2-40B4-BE49-F238E27FC236}">
+                <a16:creationId xmlns:a16="http://schemas.microsoft.com/office/drawing/2014/main" id="{A8348381-F94E-1E08-559A-B780DCA65C20}"/>
+              </a:ext>
+            </a:extLst>
+          </p:cNvPr>
+          <p:cNvSpPr>
+            <a:spLocks noGrp="1"/>
+          </p:cNvSpPr>
+          <p:nvPr>
+            <p:ph type="title"/>
+          </p:nvPr>
+        </p:nvSpPr>
+        <p:spPr/>
+        <p:txBody>
+          <a:bodyPr/>
+          <a:lstStyle/>
+          <a:p>
+            <a:r>
+              <a:rPr lang="en-US" dirty="0"/>
+              <a:t>Data Preparation </a:t>
+            </a:r>
+          </a:p>
+        </p:txBody>
+      </p:sp>
+      <p:sp>
+        <p:nvSpPr>
+          <p:cNvPr id="5" name="Text Placeholder 4">
+            <a:extLst>
+              <a:ext uri="{FF2B5EF4-FFF2-40B4-BE49-F238E27FC236}">
+                <a16:creationId xmlns:a16="http://schemas.microsoft.com/office/drawing/2014/main" id="{25519FC3-21BA-ECC8-2CCC-89A5CB1A363F}"/>
+              </a:ext>
+            </a:extLst>
+          </p:cNvPr>
+          <p:cNvSpPr>
+            <a:spLocks noGrp="1"/>
+          </p:cNvSpPr>
+          <p:nvPr>
+            <p:ph type="body" idx="1"/>
+          </p:nvPr>
+        </p:nvSpPr>
+        <p:spPr/>
+        <p:txBody>
+          <a:bodyPr/>
+          <a:lstStyle/>
+          <a:p>
+            <a:endParaRPr lang="en-US"/>
+          </a:p>
+        </p:txBody>
+      </p:sp>
+    </p:spTree>
+    <p:extLst>
+      <p:ext uri="{BB962C8B-B14F-4D97-AF65-F5344CB8AC3E}">
+        <p14:creationId xmlns:p14="http://schemas.microsoft.com/office/powerpoint/2010/main" val="4055406362"/>
+      </p:ext>
+    </p:extLst>
+  </p:cSld>
+  <p:clrMapOvr>
+    <a:masterClrMapping/>
+  </p:clrMapOvr>
+</p:sld>
+</file>
+
+<file path=ppt/slides/slide9.xml><?xml version="1.0" encoding="utf-8"?>
+<p:sld xmlns:a="http://schemas.openxmlformats.org/drawingml/2006/main" xmlns:r="http://schemas.openxmlformats.org/officeDocument/2006/relationships" xmlns:p="http://schemas.openxmlformats.org/presentationml/2006/main">
+  <p:cSld>
+    <p:spTree>
+      <p:nvGrpSpPr>
+        <p:cNvPr id="1" name=""/>
+        <p:cNvGrpSpPr/>
+        <p:nvPr/>
+      </p:nvGrpSpPr>
+      <p:grpSpPr>
+        <a:xfrm>
+          <a:off x="0" y="0"/>
+          <a:ext cx="0" cy="0"/>
+          <a:chOff x="0" y="0"/>
+          <a:chExt cx="0" cy="0"/>
+        </a:xfrm>
+      </p:grpSpPr>
+      <p:sp>
+        <p:nvSpPr>
+          <p:cNvPr id="2" name="Title 1">
+            <a:extLst>
+              <a:ext uri="{FF2B5EF4-FFF2-40B4-BE49-F238E27FC236}">
+                <a16:creationId xmlns:a16="http://schemas.microsoft.com/office/drawing/2014/main" id="{43EE6C72-03D5-F7F0-1189-4C7BA75BAA61}"/>
+              </a:ext>
+            </a:extLst>
+          </p:cNvPr>
+          <p:cNvSpPr>
+            <a:spLocks noGrp="1"/>
+          </p:cNvSpPr>
+          <p:nvPr>
+            <p:ph type="title"/>
+          </p:nvPr>
+        </p:nvSpPr>
+        <p:spPr/>
+        <p:txBody>
+          <a:bodyPr/>
+          <a:lstStyle/>
+          <a:p>
+            <a:r>
+              <a:rPr lang="en-US" dirty="0"/>
+              <a:t>Data preparation </a:t>
+            </a:r>
+          </a:p>
+        </p:txBody>
+      </p:sp>
+      <p:sp>
+        <p:nvSpPr>
+          <p:cNvPr id="3" name="Content Placeholder 2">
+            <a:extLst>
+              <a:ext uri="{FF2B5EF4-FFF2-40B4-BE49-F238E27FC236}">
+                <a16:creationId xmlns:a16="http://schemas.microsoft.com/office/drawing/2014/main" id="{2CAC2674-75A1-6757-F8C2-5CD61FD6D8AE}"/>
+              </a:ext>
+            </a:extLst>
+          </p:cNvPr>
+          <p:cNvSpPr>
+            <a:spLocks noGrp="1"/>
+          </p:cNvSpPr>
+          <p:nvPr>
+            <p:ph idx="1"/>
+          </p:nvPr>
+        </p:nvSpPr>
+        <p:spPr/>
+        <p:txBody>
+          <a:bodyPr/>
+          <a:lstStyle/>
+          <a:p>
+            <a:r>
+              <a:rPr lang="en-US" dirty="0">
+                <a:highlight>
+                  <a:srgbClr val="FFFF00"/>
+                </a:highlight>
+              </a:rPr>
+              <a:t>Describe how you Clean the data </a:t>
+            </a:r>
+          </a:p>
+          <a:p>
+            <a:r>
+              <a:rPr lang="en-US" dirty="0">
+                <a:highlight>
+                  <a:srgbClr val="FFFF00"/>
+                </a:highlight>
+              </a:rPr>
+              <a:t>Describe how you </a:t>
+            </a:r>
+            <a:r>
+              <a:rPr lang="en-US" dirty="0" err="1">
+                <a:highlight>
+                  <a:srgbClr val="FFFF00"/>
+                </a:highlight>
+              </a:rPr>
+              <a:t>Appied</a:t>
+            </a:r>
+            <a:r>
+              <a:rPr lang="en-US" dirty="0">
+                <a:highlight>
+                  <a:srgbClr val="FFFF00"/>
+                </a:highlight>
+              </a:rPr>
+              <a:t> data transformation </a:t>
+            </a:r>
+          </a:p>
+          <a:p>
+            <a:endParaRPr lang="en-US" dirty="0">
+              <a:highlight>
+                <a:srgbClr val="FFFF00"/>
+              </a:highlight>
+            </a:endParaRPr>
+          </a:p>
+          <a:p>
+            <a:endParaRPr lang="en-US" dirty="0">
+              <a:highlight>
+                <a:srgbClr val="FFFF00"/>
+              </a:highlight>
+            </a:endParaRPr>
+          </a:p>
+        </p:txBody>
+      </p:sp>
+    </p:spTree>
+    <p:extLst>
+      <p:ext uri="{BB962C8B-B14F-4D97-AF65-F5344CB8AC3E}">
+        <p14:creationId xmlns:p14="http://schemas.microsoft.com/office/powerpoint/2010/main" val="2543842627"/>
+      </p:ext>
+    </p:extLst>
+  </p:cSld>
+  <p:clrMapOvr>
+    <a:masterClrMapping/>
+  </p:clrMapOvr>
+</p:sld>
+</file>
+
 <file path=ppt/theme/theme1.xml><?xml version="1.0" encoding="utf-8"?>
 <a:theme xmlns:a="http://schemas.openxmlformats.org/drawingml/2006/main" name="Office Theme">
   <a:themeElements>

</xml_diff>